<commit_message>
added a bullet to one slide
</commit_message>
<xml_diff>
--- a/PowerPoints/09 - Constraint Analysis.pptx
+++ b/PowerPoints/09 - Constraint Analysis.pptx
@@ -7480,58 +7480,35 @@
           </a:p>
           <a:p>
             <a:r>
-              <a:rPr lang="en-US" sz="2200" dirty="0" err="1">
-                <a:latin typeface="Consolas" panose="020B0609020204030204" pitchFamily="49" charset="0"/>
-              </a:rPr>
-              <a:t>OutputStmt</a:t>
-            </a:r>
-            <a:endParaRPr lang="en-US" sz="2200" dirty="0">
-              <a:latin typeface="Consolas" panose="020B0609020204030204" pitchFamily="49" charset="0"/>
-            </a:endParaRPr>
+              <a:rPr lang="en-US" sz="2200" dirty="0">
+                <a:latin typeface="Consolas" panose="020B0609020204030204" pitchFamily="49" charset="0"/>
+              </a:rPr>
+              <a:t>Program</a:t>
+            </a:r>
           </a:p>
           <a:p>
             <a:pPr lvl="1"/>
             <a:r>
               <a:rPr lang="en-US" sz="1900" dirty="0"/>
-              <a:t>Type Rule: Each expression must have type </a:t>
+              <a:t>Miscellaneous Rule: A program must contain a </a:t>
+            </a:r>
+            <a:r>
+              <a:rPr lang="en-US" sz="1900" dirty="0" err="1"/>
+              <a:t>parameterless</a:t>
+            </a:r>
+            <a:r>
+              <a:rPr lang="en-US" sz="1900" dirty="0"/>
+              <a:t> procedure named </a:t>
             </a:r>
             <a:r>
               <a:rPr lang="en-US" sz="1900" dirty="0">
                 <a:latin typeface="Consolas" panose="020B0609020204030204" pitchFamily="49" charset="0"/>
               </a:rPr>
-              <a:t>Integer</a:t>
+              <a:t>main()</a:t>
             </a:r>
             <a:r>
               <a:rPr lang="en-US" sz="1900" dirty="0"/>
-              <a:t>, </a:t>
-            </a:r>
-            <a:r>
-              <a:rPr lang="en-US" sz="1900" dirty="0">
-                <a:latin typeface="Consolas" panose="020B0609020204030204" pitchFamily="49" charset="0"/>
-              </a:rPr>
-              <a:t>Char</a:t>
-            </a:r>
-            <a:r>
-              <a:rPr lang="en-US" sz="1900" dirty="0"/>
-              <a:t>, </a:t>
-            </a:r>
-            <a:r>
-              <a:rPr lang="en-US" sz="1900" dirty="0">
-                <a:latin typeface="Consolas" panose="020B0609020204030204" pitchFamily="49" charset="0"/>
-              </a:rPr>
-              <a:t>Boolean</a:t>
-            </a:r>
-            <a:r>
-              <a:rPr lang="en-US" sz="1900" dirty="0"/>
-              <a:t>, or a string type.  Output is supported only for integers, characters, </a:t>
-            </a:r>
-            <a:r>
-              <a:rPr lang="en-US" sz="1900" dirty="0" err="1"/>
-              <a:t>booleans</a:t>
-            </a:r>
-            <a:r>
-              <a:rPr lang="en-US" sz="1900" dirty="0"/>
-              <a:t>, and strings.</a:t>
+              <a:t>.</a:t>
             </a:r>
           </a:p>
         </p:txBody>
@@ -7665,6 +7642,62 @@
         <p:txBody>
           <a:bodyPr/>
           <a:lstStyle/>
+          <a:p>
+            <a:r>
+              <a:rPr lang="en-US" sz="2200" dirty="0" err="1">
+                <a:latin typeface="Consolas" panose="020B0609020204030204" pitchFamily="49" charset="0"/>
+              </a:rPr>
+              <a:t>OutputStmt</a:t>
+            </a:r>
+            <a:endParaRPr lang="en-US" sz="2200" dirty="0">
+              <a:latin typeface="Consolas" panose="020B0609020204030204" pitchFamily="49" charset="0"/>
+            </a:endParaRPr>
+          </a:p>
+          <a:p>
+            <a:pPr lvl="1"/>
+            <a:r>
+              <a:rPr lang="en-US" sz="1900" dirty="0"/>
+              <a:t>Type Rule: Each expression must have type </a:t>
+            </a:r>
+            <a:r>
+              <a:rPr lang="en-US" sz="1900" dirty="0">
+                <a:latin typeface="Consolas" panose="020B0609020204030204" pitchFamily="49" charset="0"/>
+              </a:rPr>
+              <a:t>Integer</a:t>
+            </a:r>
+            <a:r>
+              <a:rPr lang="en-US" sz="1900" dirty="0"/>
+              <a:t>, </a:t>
+            </a:r>
+            <a:r>
+              <a:rPr lang="en-US" sz="1900" dirty="0">
+                <a:latin typeface="Consolas" panose="020B0609020204030204" pitchFamily="49" charset="0"/>
+              </a:rPr>
+              <a:t>Char</a:t>
+            </a:r>
+            <a:r>
+              <a:rPr lang="en-US" sz="1900" dirty="0"/>
+              <a:t>, </a:t>
+            </a:r>
+            <a:r>
+              <a:rPr lang="en-US" sz="1900" dirty="0">
+                <a:latin typeface="Consolas" panose="020B0609020204030204" pitchFamily="49" charset="0"/>
+              </a:rPr>
+              <a:t>Boolean</a:t>
+            </a:r>
+            <a:r>
+              <a:rPr lang="en-US" sz="1900" dirty="0"/>
+              <a:t>, or a string type.  Output is supported only for integers, characters, </a:t>
+            </a:r>
+            <a:r>
+              <a:rPr lang="en-US" sz="1900" dirty="0" err="1"/>
+              <a:t>booleans</a:t>
+            </a:r>
+            <a:r>
+              <a:rPr lang="en-US" sz="1900" dirty="0"/>
+              <a:t>, and strings.</a:t>
+            </a:r>
+          </a:p>
           <a:p>
             <a:r>
               <a:rPr lang="en-US" sz="2200" dirty="0" err="1">

</xml_diff>